<commit_message>
Add problem 14.6 and improve others
</commit_message>
<xml_diff>
--- a/Figures/Chapter_14/drawings/Fig14.X_electrify_everything.pptx
+++ b/Figures/Chapter_14/drawings/Fig14.X_electrify_everything.pptx
@@ -6,7 +6,6 @@
   </p:sldMasterIdLst>
   <p:sldIdLst>
     <p:sldId id="259" r:id="rId2"/>
-    <p:sldId id="260" r:id="rId3"/>
   </p:sldIdLst>
   <p:sldSz cx="12192000" cy="6858000"/>
   <p:notesSz cx="6858000" cy="9144000"/>
@@ -262,7 +261,7 @@
           <a:p>
             <a:fld id="{8B1A925D-6802-4F82-B3A4-43BDB522D203}" type="datetimeFigureOut">
               <a:rPr lang="en-GB" smtClean="0"/>
-              <a:t>25/04/2022</a:t>
+              <a:t>15/03/2023</a:t>
             </a:fld>
             <a:endParaRPr lang="en-GB"/>
           </a:p>
@@ -462,7 +461,7 @@
           <a:p>
             <a:fld id="{8B1A925D-6802-4F82-B3A4-43BDB522D203}" type="datetimeFigureOut">
               <a:rPr lang="en-GB" smtClean="0"/>
-              <a:t>25/04/2022</a:t>
+              <a:t>15/03/2023</a:t>
             </a:fld>
             <a:endParaRPr lang="en-GB"/>
           </a:p>
@@ -672,7 +671,7 @@
           <a:p>
             <a:fld id="{8B1A925D-6802-4F82-B3A4-43BDB522D203}" type="datetimeFigureOut">
               <a:rPr lang="en-GB" smtClean="0"/>
-              <a:t>25/04/2022</a:t>
+              <a:t>15/03/2023</a:t>
             </a:fld>
             <a:endParaRPr lang="en-GB"/>
           </a:p>
@@ -872,7 +871,7 @@
           <a:p>
             <a:fld id="{8B1A925D-6802-4F82-B3A4-43BDB522D203}" type="datetimeFigureOut">
               <a:rPr lang="en-GB" smtClean="0"/>
-              <a:t>25/04/2022</a:t>
+              <a:t>15/03/2023</a:t>
             </a:fld>
             <a:endParaRPr lang="en-GB"/>
           </a:p>
@@ -1148,7 +1147,7 @@
           <a:p>
             <a:fld id="{8B1A925D-6802-4F82-B3A4-43BDB522D203}" type="datetimeFigureOut">
               <a:rPr lang="en-GB" smtClean="0"/>
-              <a:t>25/04/2022</a:t>
+              <a:t>15/03/2023</a:t>
             </a:fld>
             <a:endParaRPr lang="en-GB"/>
           </a:p>
@@ -1416,7 +1415,7 @@
           <a:p>
             <a:fld id="{8B1A925D-6802-4F82-B3A4-43BDB522D203}" type="datetimeFigureOut">
               <a:rPr lang="en-GB" smtClean="0"/>
-              <a:t>25/04/2022</a:t>
+              <a:t>15/03/2023</a:t>
             </a:fld>
             <a:endParaRPr lang="en-GB"/>
           </a:p>
@@ -1831,7 +1830,7 @@
           <a:p>
             <a:fld id="{8B1A925D-6802-4F82-B3A4-43BDB522D203}" type="datetimeFigureOut">
               <a:rPr lang="en-GB" smtClean="0"/>
-              <a:t>25/04/2022</a:t>
+              <a:t>15/03/2023</a:t>
             </a:fld>
             <a:endParaRPr lang="en-GB"/>
           </a:p>
@@ -1973,7 +1972,7 @@
           <a:p>
             <a:fld id="{8B1A925D-6802-4F82-B3A4-43BDB522D203}" type="datetimeFigureOut">
               <a:rPr lang="en-GB" smtClean="0"/>
-              <a:t>25/04/2022</a:t>
+              <a:t>15/03/2023</a:t>
             </a:fld>
             <a:endParaRPr lang="en-GB"/>
           </a:p>
@@ -2086,7 +2085,7 @@
           <a:p>
             <a:fld id="{8B1A925D-6802-4F82-B3A4-43BDB522D203}" type="datetimeFigureOut">
               <a:rPr lang="en-GB" smtClean="0"/>
-              <a:t>25/04/2022</a:t>
+              <a:t>15/03/2023</a:t>
             </a:fld>
             <a:endParaRPr lang="en-GB"/>
           </a:p>
@@ -2399,7 +2398,7 @@
           <a:p>
             <a:fld id="{8B1A925D-6802-4F82-B3A4-43BDB522D203}" type="datetimeFigureOut">
               <a:rPr lang="en-GB" smtClean="0"/>
-              <a:t>25/04/2022</a:t>
+              <a:t>15/03/2023</a:t>
             </a:fld>
             <a:endParaRPr lang="en-GB"/>
           </a:p>
@@ -2688,7 +2687,7 @@
           <a:p>
             <a:fld id="{8B1A925D-6802-4F82-B3A4-43BDB522D203}" type="datetimeFigureOut">
               <a:rPr lang="en-GB" smtClean="0"/>
-              <a:t>25/04/2022</a:t>
+              <a:t>15/03/2023</a:t>
             </a:fld>
             <a:endParaRPr lang="en-GB"/>
           </a:p>
@@ -2931,7 +2930,7 @@
           <a:p>
             <a:fld id="{8B1A925D-6802-4F82-B3A4-43BDB522D203}" type="datetimeFigureOut">
               <a:rPr lang="en-GB" smtClean="0"/>
-              <a:t>25/04/2022</a:t>
+              <a:t>15/03/2023</a:t>
             </a:fld>
             <a:endParaRPr lang="en-GB"/>
           </a:p>
@@ -4724,7 +4723,7 @@
               <a:pPr algn="ctr"/>
               <a:r>
                 <a:rPr lang="en-GB" sz="2200" b="1" dirty="0"/>
-                <a:t>Transport</a:t>
+                <a:t>Transportation</a:t>
               </a:r>
             </a:p>
           </p:txBody>
@@ -4734,66 +4733,6 @@
     <p:extLst>
       <p:ext uri="{BB962C8B-B14F-4D97-AF65-F5344CB8AC3E}">
         <p14:creationId xmlns:p14="http://schemas.microsoft.com/office/powerpoint/2010/main" val="1728420474"/>
-      </p:ext>
-    </p:extLst>
-  </p:cSld>
-  <p:clrMapOvr>
-    <a:masterClrMapping/>
-  </p:clrMapOvr>
-</p:sld>
-</file>
-
-<file path=ppt/slides/slide2.xml><?xml version="1.0" encoding="utf-8"?>
-<p:sld xmlns:a="http://schemas.openxmlformats.org/drawingml/2006/main" xmlns:r="http://schemas.openxmlformats.org/officeDocument/2006/relationships" xmlns:p="http://schemas.openxmlformats.org/presentationml/2006/main">
-  <p:cSld>
-    <p:spTree>
-      <p:nvGrpSpPr>
-        <p:cNvPr id="1" name=""/>
-        <p:cNvGrpSpPr/>
-        <p:nvPr/>
-      </p:nvGrpSpPr>
-      <p:grpSpPr>
-        <a:xfrm>
-          <a:off x="0" y="0"/>
-          <a:ext cx="0" cy="0"/>
-          <a:chOff x="0" y="0"/>
-          <a:chExt cx="0" cy="0"/>
-        </a:xfrm>
-      </p:grpSpPr>
-      <p:pic>
-        <p:nvPicPr>
-          <p:cNvPr id="326" name="Picture 325">
-            <a:extLst>
-              <a:ext uri="{FF2B5EF4-FFF2-40B4-BE49-F238E27FC236}">
-                <a16:creationId xmlns:a16="http://schemas.microsoft.com/office/drawing/2014/main" id="{BA44EC0C-C097-4214-8C4E-C757DEA7716F}"/>
-              </a:ext>
-            </a:extLst>
-          </p:cNvPr>
-          <p:cNvPicPr>
-            <a:picLocks noChangeAspect="1"/>
-          </p:cNvPicPr>
-          <p:nvPr/>
-        </p:nvPicPr>
-        <p:blipFill>
-          <a:blip r:embed="rId2"/>
-          <a:stretch>
-            <a:fillRect/>
-          </a:stretch>
-        </p:blipFill>
-        <p:spPr>
-          <a:xfrm>
-            <a:off x="988993" y="1225555"/>
-            <a:ext cx="9038492" cy="4961853"/>
-          </a:xfrm>
-          <a:prstGeom prst="rect">
-            <a:avLst/>
-          </a:prstGeom>
-        </p:spPr>
-      </p:pic>
-    </p:spTree>
-    <p:extLst>
-      <p:ext uri="{BB962C8B-B14F-4D97-AF65-F5344CB8AC3E}">
-        <p14:creationId xmlns:p14="http://schemas.microsoft.com/office/powerpoint/2010/main" val="2161484677"/>
       </p:ext>
     </p:extLst>
   </p:cSld>

</xml_diff>

<commit_message>
update figures correlation length and electrify everything
</commit_message>
<xml_diff>
--- a/Figures/Chapter_14/drawings/Fig14.X_electrify_everything.pptx
+++ b/Figures/Chapter_14/drawings/Fig14.X_electrify_everything.pptx
@@ -4,6 +4,9 @@
   <p:sldMasterIdLst>
     <p:sldMasterId id="2147483648" r:id="rId1"/>
   </p:sldMasterIdLst>
+  <p:notesMasterIdLst>
+    <p:notesMasterId r:id="rId3"/>
+  </p:notesMasterIdLst>
   <p:sldIdLst>
     <p:sldId id="259" r:id="rId2"/>
   </p:sldIdLst>
@@ -112,6 +115,356 @@
 </p:presentation>
 </file>
 
+<file path=ppt/notesMasters/notesMaster1.xml><?xml version="1.0" encoding="utf-8"?>
+<p:notesMaster xmlns:a="http://schemas.openxmlformats.org/drawingml/2006/main" xmlns:r="http://schemas.openxmlformats.org/officeDocument/2006/relationships" xmlns:p="http://schemas.openxmlformats.org/presentationml/2006/main">
+  <p:cSld>
+    <p:bg>
+      <p:bgRef idx="1001">
+        <a:schemeClr val="bg1"/>
+      </p:bgRef>
+    </p:bg>
+    <p:spTree>
+      <p:nvGrpSpPr>
+        <p:cNvPr id="1" name=""/>
+        <p:cNvGrpSpPr/>
+        <p:nvPr/>
+      </p:nvGrpSpPr>
+      <p:grpSpPr>
+        <a:xfrm>
+          <a:off x="0" y="0"/>
+          <a:ext cx="0" cy="0"/>
+          <a:chOff x="0" y="0"/>
+          <a:chExt cx="0" cy="0"/>
+        </a:xfrm>
+      </p:grpSpPr>
+      <p:sp>
+        <p:nvSpPr>
+          <p:cNvPr id="2" name="Header Placeholder 1"/>
+          <p:cNvSpPr>
+            <a:spLocks noGrp="1"/>
+          </p:cNvSpPr>
+          <p:nvPr>
+            <p:ph type="hdr" sz="quarter"/>
+          </p:nvPr>
+        </p:nvSpPr>
+        <p:spPr>
+          <a:xfrm>
+            <a:off x="0" y="0"/>
+            <a:ext cx="2971800" cy="458788"/>
+          </a:xfrm>
+          <a:prstGeom prst="rect">
+            <a:avLst/>
+          </a:prstGeom>
+        </p:spPr>
+        <p:txBody>
+          <a:bodyPr vert="horz" lIns="91440" tIns="45720" rIns="91440" bIns="45720" rtlCol="0"/>
+          <a:lstStyle>
+            <a:lvl1pPr algn="l">
+              <a:defRPr sz="1200"/>
+            </a:lvl1pPr>
+          </a:lstStyle>
+          <a:p>
+            <a:endParaRPr lang="en-GB"/>
+          </a:p>
+        </p:txBody>
+      </p:sp>
+      <p:sp>
+        <p:nvSpPr>
+          <p:cNvPr id="3" name="Date Placeholder 2"/>
+          <p:cNvSpPr>
+            <a:spLocks noGrp="1"/>
+          </p:cNvSpPr>
+          <p:nvPr>
+            <p:ph type="dt" idx="1"/>
+          </p:nvPr>
+        </p:nvSpPr>
+        <p:spPr>
+          <a:xfrm>
+            <a:off x="3884613" y="0"/>
+            <a:ext cx="2971800" cy="458788"/>
+          </a:xfrm>
+          <a:prstGeom prst="rect">
+            <a:avLst/>
+          </a:prstGeom>
+        </p:spPr>
+        <p:txBody>
+          <a:bodyPr vert="horz" lIns="91440" tIns="45720" rIns="91440" bIns="45720" rtlCol="0"/>
+          <a:lstStyle>
+            <a:lvl1pPr algn="r">
+              <a:defRPr sz="1200"/>
+            </a:lvl1pPr>
+          </a:lstStyle>
+          <a:p>
+            <a:fld id="{4DB8DD30-3A07-41EA-9096-55FEE0C0E9E8}" type="datetimeFigureOut">
+              <a:rPr lang="en-GB" smtClean="0"/>
+              <a:t>19/08/2023</a:t>
+            </a:fld>
+            <a:endParaRPr lang="en-GB"/>
+          </a:p>
+        </p:txBody>
+      </p:sp>
+      <p:sp>
+        <p:nvSpPr>
+          <p:cNvPr id="4" name="Slide Image Placeholder 3"/>
+          <p:cNvSpPr>
+            <a:spLocks noGrp="1" noRot="1" noChangeAspect="1"/>
+          </p:cNvSpPr>
+          <p:nvPr>
+            <p:ph type="sldImg" idx="2"/>
+          </p:nvPr>
+        </p:nvSpPr>
+        <p:spPr>
+          <a:xfrm>
+            <a:off x="685800" y="1143000"/>
+            <a:ext cx="5486400" cy="3086100"/>
+          </a:xfrm>
+          <a:prstGeom prst="rect">
+            <a:avLst/>
+          </a:prstGeom>
+          <a:noFill/>
+          <a:ln w="12700">
+            <a:solidFill>
+              <a:prstClr val="black"/>
+            </a:solidFill>
+          </a:ln>
+        </p:spPr>
+        <p:txBody>
+          <a:bodyPr vert="horz" lIns="91440" tIns="45720" rIns="91440" bIns="45720" rtlCol="0" anchor="ctr"/>
+          <a:lstStyle/>
+          <a:p>
+            <a:endParaRPr lang="en-GB"/>
+          </a:p>
+        </p:txBody>
+      </p:sp>
+      <p:sp>
+        <p:nvSpPr>
+          <p:cNvPr id="5" name="Notes Placeholder 4"/>
+          <p:cNvSpPr>
+            <a:spLocks noGrp="1"/>
+          </p:cNvSpPr>
+          <p:nvPr>
+            <p:ph type="body" sz="quarter" idx="3"/>
+          </p:nvPr>
+        </p:nvSpPr>
+        <p:spPr>
+          <a:xfrm>
+            <a:off x="685800" y="4400550"/>
+            <a:ext cx="5486400" cy="3600450"/>
+          </a:xfrm>
+          <a:prstGeom prst="rect">
+            <a:avLst/>
+          </a:prstGeom>
+        </p:spPr>
+        <p:txBody>
+          <a:bodyPr vert="horz" lIns="91440" tIns="45720" rIns="91440" bIns="45720" rtlCol="0"/>
+          <a:lstStyle/>
+          <a:p>
+            <a:pPr lvl="0"/>
+            <a:r>
+              <a:rPr lang="en-US"/>
+              <a:t>Click to edit Master text styles</a:t>
+            </a:r>
+          </a:p>
+          <a:p>
+            <a:pPr lvl="1"/>
+            <a:r>
+              <a:rPr lang="en-US"/>
+              <a:t>Second level</a:t>
+            </a:r>
+          </a:p>
+          <a:p>
+            <a:pPr lvl="2"/>
+            <a:r>
+              <a:rPr lang="en-US"/>
+              <a:t>Third level</a:t>
+            </a:r>
+          </a:p>
+          <a:p>
+            <a:pPr lvl="3"/>
+            <a:r>
+              <a:rPr lang="en-US"/>
+              <a:t>Fourth level</a:t>
+            </a:r>
+          </a:p>
+          <a:p>
+            <a:pPr lvl="4"/>
+            <a:r>
+              <a:rPr lang="en-US"/>
+              <a:t>Fifth level</a:t>
+            </a:r>
+            <a:endParaRPr lang="en-GB"/>
+          </a:p>
+        </p:txBody>
+      </p:sp>
+      <p:sp>
+        <p:nvSpPr>
+          <p:cNvPr id="6" name="Footer Placeholder 5"/>
+          <p:cNvSpPr>
+            <a:spLocks noGrp="1"/>
+          </p:cNvSpPr>
+          <p:nvPr>
+            <p:ph type="ftr" sz="quarter" idx="4"/>
+          </p:nvPr>
+        </p:nvSpPr>
+        <p:spPr>
+          <a:xfrm>
+            <a:off x="0" y="8685213"/>
+            <a:ext cx="2971800" cy="458787"/>
+          </a:xfrm>
+          <a:prstGeom prst="rect">
+            <a:avLst/>
+          </a:prstGeom>
+        </p:spPr>
+        <p:txBody>
+          <a:bodyPr vert="horz" lIns="91440" tIns="45720" rIns="91440" bIns="45720" rtlCol="0" anchor="b"/>
+          <a:lstStyle>
+            <a:lvl1pPr algn="l">
+              <a:defRPr sz="1200"/>
+            </a:lvl1pPr>
+          </a:lstStyle>
+          <a:p>
+            <a:endParaRPr lang="en-GB"/>
+          </a:p>
+        </p:txBody>
+      </p:sp>
+      <p:sp>
+        <p:nvSpPr>
+          <p:cNvPr id="7" name="Slide Number Placeholder 6"/>
+          <p:cNvSpPr>
+            <a:spLocks noGrp="1"/>
+          </p:cNvSpPr>
+          <p:nvPr>
+            <p:ph type="sldNum" sz="quarter" idx="5"/>
+          </p:nvPr>
+        </p:nvSpPr>
+        <p:spPr>
+          <a:xfrm>
+            <a:off x="3884613" y="8685213"/>
+            <a:ext cx="2971800" cy="458787"/>
+          </a:xfrm>
+          <a:prstGeom prst="rect">
+            <a:avLst/>
+          </a:prstGeom>
+        </p:spPr>
+        <p:txBody>
+          <a:bodyPr vert="horz" lIns="91440" tIns="45720" rIns="91440" bIns="45720" rtlCol="0" anchor="b"/>
+          <a:lstStyle>
+            <a:lvl1pPr algn="r">
+              <a:defRPr sz="1200"/>
+            </a:lvl1pPr>
+          </a:lstStyle>
+          <a:p>
+            <a:fld id="{360FC093-C749-4BF5-AB2A-F2B88D50281B}" type="slidenum">
+              <a:rPr lang="en-GB" smtClean="0"/>
+              <a:t>‹#›</a:t>
+            </a:fld>
+            <a:endParaRPr lang="en-GB"/>
+          </a:p>
+        </p:txBody>
+      </p:sp>
+    </p:spTree>
+    <p:extLst>
+      <p:ext uri="{BB962C8B-B14F-4D97-AF65-F5344CB8AC3E}">
+        <p14:creationId xmlns:p14="http://schemas.microsoft.com/office/powerpoint/2010/main" val="3035216645"/>
+      </p:ext>
+    </p:extLst>
+  </p:cSld>
+  <p:clrMap bg1="lt1" tx1="dk1" bg2="lt2" tx2="dk2" accent1="accent1" accent2="accent2" accent3="accent3" accent4="accent4" accent5="accent5" accent6="accent6" hlink="hlink" folHlink="folHlink"/>
+  <p:notesStyle>
+    <a:lvl1pPr marL="0" algn="l" defTabSz="914400" rtl="0" eaLnBrk="1" latinLnBrk="0" hangingPunct="1">
+      <a:defRPr sz="1200" kern="1200">
+        <a:solidFill>
+          <a:schemeClr val="tx1"/>
+        </a:solidFill>
+        <a:latin typeface="+mn-lt"/>
+        <a:ea typeface="+mn-ea"/>
+        <a:cs typeface="+mn-cs"/>
+      </a:defRPr>
+    </a:lvl1pPr>
+    <a:lvl2pPr marL="457200" algn="l" defTabSz="914400" rtl="0" eaLnBrk="1" latinLnBrk="0" hangingPunct="1">
+      <a:defRPr sz="1200" kern="1200">
+        <a:solidFill>
+          <a:schemeClr val="tx1"/>
+        </a:solidFill>
+        <a:latin typeface="+mn-lt"/>
+        <a:ea typeface="+mn-ea"/>
+        <a:cs typeface="+mn-cs"/>
+      </a:defRPr>
+    </a:lvl2pPr>
+    <a:lvl3pPr marL="914400" algn="l" defTabSz="914400" rtl="0" eaLnBrk="1" latinLnBrk="0" hangingPunct="1">
+      <a:defRPr sz="1200" kern="1200">
+        <a:solidFill>
+          <a:schemeClr val="tx1"/>
+        </a:solidFill>
+        <a:latin typeface="+mn-lt"/>
+        <a:ea typeface="+mn-ea"/>
+        <a:cs typeface="+mn-cs"/>
+      </a:defRPr>
+    </a:lvl3pPr>
+    <a:lvl4pPr marL="1371600" algn="l" defTabSz="914400" rtl="0" eaLnBrk="1" latinLnBrk="0" hangingPunct="1">
+      <a:defRPr sz="1200" kern="1200">
+        <a:solidFill>
+          <a:schemeClr val="tx1"/>
+        </a:solidFill>
+        <a:latin typeface="+mn-lt"/>
+        <a:ea typeface="+mn-ea"/>
+        <a:cs typeface="+mn-cs"/>
+      </a:defRPr>
+    </a:lvl4pPr>
+    <a:lvl5pPr marL="1828800" algn="l" defTabSz="914400" rtl="0" eaLnBrk="1" latinLnBrk="0" hangingPunct="1">
+      <a:defRPr sz="1200" kern="1200">
+        <a:solidFill>
+          <a:schemeClr val="tx1"/>
+        </a:solidFill>
+        <a:latin typeface="+mn-lt"/>
+        <a:ea typeface="+mn-ea"/>
+        <a:cs typeface="+mn-cs"/>
+      </a:defRPr>
+    </a:lvl5pPr>
+    <a:lvl6pPr marL="2286000" algn="l" defTabSz="914400" rtl="0" eaLnBrk="1" latinLnBrk="0" hangingPunct="1">
+      <a:defRPr sz="1200" kern="1200">
+        <a:solidFill>
+          <a:schemeClr val="tx1"/>
+        </a:solidFill>
+        <a:latin typeface="+mn-lt"/>
+        <a:ea typeface="+mn-ea"/>
+        <a:cs typeface="+mn-cs"/>
+      </a:defRPr>
+    </a:lvl6pPr>
+    <a:lvl7pPr marL="2743200" algn="l" defTabSz="914400" rtl="0" eaLnBrk="1" latinLnBrk="0" hangingPunct="1">
+      <a:defRPr sz="1200" kern="1200">
+        <a:solidFill>
+          <a:schemeClr val="tx1"/>
+        </a:solidFill>
+        <a:latin typeface="+mn-lt"/>
+        <a:ea typeface="+mn-ea"/>
+        <a:cs typeface="+mn-cs"/>
+      </a:defRPr>
+    </a:lvl7pPr>
+    <a:lvl8pPr marL="3200400" algn="l" defTabSz="914400" rtl="0" eaLnBrk="1" latinLnBrk="0" hangingPunct="1">
+      <a:defRPr sz="1200" kern="1200">
+        <a:solidFill>
+          <a:schemeClr val="tx1"/>
+        </a:solidFill>
+        <a:latin typeface="+mn-lt"/>
+        <a:ea typeface="+mn-ea"/>
+        <a:cs typeface="+mn-cs"/>
+      </a:defRPr>
+    </a:lvl8pPr>
+    <a:lvl9pPr marL="3657600" algn="l" defTabSz="914400" rtl="0" eaLnBrk="1" latinLnBrk="0" hangingPunct="1">
+      <a:defRPr sz="1200" kern="1200">
+        <a:solidFill>
+          <a:schemeClr val="tx1"/>
+        </a:solidFill>
+        <a:latin typeface="+mn-lt"/>
+        <a:ea typeface="+mn-ea"/>
+        <a:cs typeface="+mn-cs"/>
+      </a:defRPr>
+    </a:lvl9pPr>
+  </p:notesStyle>
+</p:notesMaster>
+</file>
+
 <file path=ppt/slideLayouts/slideLayout1.xml><?xml version="1.0" encoding="utf-8"?>
 <p:sldLayout xmlns:a="http://schemas.openxmlformats.org/drawingml/2006/main" xmlns:r="http://schemas.openxmlformats.org/officeDocument/2006/relationships" xmlns:p="http://schemas.openxmlformats.org/presentationml/2006/main" type="title" preserve="1">
   <p:cSld name="Title Slide">
@@ -261,7 +614,7 @@
           <a:p>
             <a:fld id="{8B1A925D-6802-4F82-B3A4-43BDB522D203}" type="datetimeFigureOut">
               <a:rPr lang="en-GB" smtClean="0"/>
-              <a:t>15/03/2023</a:t>
+              <a:t>19/08/2023</a:t>
             </a:fld>
             <a:endParaRPr lang="en-GB"/>
           </a:p>
@@ -461,7 +814,7 @@
           <a:p>
             <a:fld id="{8B1A925D-6802-4F82-B3A4-43BDB522D203}" type="datetimeFigureOut">
               <a:rPr lang="en-GB" smtClean="0"/>
-              <a:t>15/03/2023</a:t>
+              <a:t>19/08/2023</a:t>
             </a:fld>
             <a:endParaRPr lang="en-GB"/>
           </a:p>
@@ -671,7 +1024,7 @@
           <a:p>
             <a:fld id="{8B1A925D-6802-4F82-B3A4-43BDB522D203}" type="datetimeFigureOut">
               <a:rPr lang="en-GB" smtClean="0"/>
-              <a:t>15/03/2023</a:t>
+              <a:t>19/08/2023</a:t>
             </a:fld>
             <a:endParaRPr lang="en-GB"/>
           </a:p>
@@ -871,7 +1224,7 @@
           <a:p>
             <a:fld id="{8B1A925D-6802-4F82-B3A4-43BDB522D203}" type="datetimeFigureOut">
               <a:rPr lang="en-GB" smtClean="0"/>
-              <a:t>15/03/2023</a:t>
+              <a:t>19/08/2023</a:t>
             </a:fld>
             <a:endParaRPr lang="en-GB"/>
           </a:p>
@@ -1147,7 +1500,7 @@
           <a:p>
             <a:fld id="{8B1A925D-6802-4F82-B3A4-43BDB522D203}" type="datetimeFigureOut">
               <a:rPr lang="en-GB" smtClean="0"/>
-              <a:t>15/03/2023</a:t>
+              <a:t>19/08/2023</a:t>
             </a:fld>
             <a:endParaRPr lang="en-GB"/>
           </a:p>
@@ -1415,7 +1768,7 @@
           <a:p>
             <a:fld id="{8B1A925D-6802-4F82-B3A4-43BDB522D203}" type="datetimeFigureOut">
               <a:rPr lang="en-GB" smtClean="0"/>
-              <a:t>15/03/2023</a:t>
+              <a:t>19/08/2023</a:t>
             </a:fld>
             <a:endParaRPr lang="en-GB"/>
           </a:p>
@@ -1830,7 +2183,7 @@
           <a:p>
             <a:fld id="{8B1A925D-6802-4F82-B3A4-43BDB522D203}" type="datetimeFigureOut">
               <a:rPr lang="en-GB" smtClean="0"/>
-              <a:t>15/03/2023</a:t>
+              <a:t>19/08/2023</a:t>
             </a:fld>
             <a:endParaRPr lang="en-GB"/>
           </a:p>
@@ -1972,7 +2325,7 @@
           <a:p>
             <a:fld id="{8B1A925D-6802-4F82-B3A4-43BDB522D203}" type="datetimeFigureOut">
               <a:rPr lang="en-GB" smtClean="0"/>
-              <a:t>15/03/2023</a:t>
+              <a:t>19/08/2023</a:t>
             </a:fld>
             <a:endParaRPr lang="en-GB"/>
           </a:p>
@@ -2085,7 +2438,7 @@
           <a:p>
             <a:fld id="{8B1A925D-6802-4F82-B3A4-43BDB522D203}" type="datetimeFigureOut">
               <a:rPr lang="en-GB" smtClean="0"/>
-              <a:t>15/03/2023</a:t>
+              <a:t>19/08/2023</a:t>
             </a:fld>
             <a:endParaRPr lang="en-GB"/>
           </a:p>
@@ -2398,7 +2751,7 @@
           <a:p>
             <a:fld id="{8B1A925D-6802-4F82-B3A4-43BDB522D203}" type="datetimeFigureOut">
               <a:rPr lang="en-GB" smtClean="0"/>
-              <a:t>15/03/2023</a:t>
+              <a:t>19/08/2023</a:t>
             </a:fld>
             <a:endParaRPr lang="en-GB"/>
           </a:p>
@@ -2687,7 +3040,7 @@
           <a:p>
             <a:fld id="{8B1A925D-6802-4F82-B3A4-43BDB522D203}" type="datetimeFigureOut">
               <a:rPr lang="en-GB" smtClean="0"/>
-              <a:t>15/03/2023</a:t>
+              <a:t>19/08/2023</a:t>
             </a:fld>
             <a:endParaRPr lang="en-GB"/>
           </a:p>
@@ -2930,7 +3283,7 @@
           <a:p>
             <a:fld id="{8B1A925D-6802-4F82-B3A4-43BDB522D203}" type="datetimeFigureOut">
               <a:rPr lang="en-GB" smtClean="0"/>
-              <a:t>15/03/2023</a:t>
+              <a:t>19/08/2023</a:t>
             </a:fld>
             <a:endParaRPr lang="en-GB"/>
           </a:p>
@@ -3475,7 +3828,7 @@
           </p:nvSpPr>
           <p:spPr>
             <a:xfrm>
-              <a:off x="1918600" y="1871844"/>
+              <a:off x="1909635" y="1871844"/>
               <a:ext cx="1800000" cy="720000"/>
             </a:xfrm>
             <a:prstGeom prst="homePlate">
@@ -3484,7 +3837,7 @@
               </a:avLst>
             </a:prstGeom>
             <a:solidFill>
-              <a:srgbClr val="00B0F0"/>
+              <a:srgbClr val="5FA1D8"/>
             </a:solidFill>
             <a:ln>
               <a:noFill/>
@@ -3541,7 +3894,7 @@
               </a:avLst>
             </a:prstGeom>
             <a:solidFill>
-              <a:schemeClr val="accent2"/>
+              <a:srgbClr val="F18B45"/>
             </a:solidFill>
             <a:ln>
               <a:noFill/>
@@ -3631,7 +3984,7 @@
               <a:avLst/>
             </a:prstGeom>
             <a:solidFill>
-              <a:srgbClr val="92D050"/>
+              <a:srgbClr val="498F34"/>
             </a:solidFill>
             <a:ln>
               <a:noFill/>
@@ -3692,7 +4045,7 @@
               </a:avLst>
             </a:prstGeom>
             <a:solidFill>
-              <a:srgbClr val="00B0F0"/>
+              <a:srgbClr val="5FA1D8"/>
             </a:solidFill>
             <a:ln>
               <a:noFill/>
@@ -3843,7 +4196,7 @@
               </a:avLst>
             </a:prstGeom>
             <a:solidFill>
-              <a:srgbClr val="00B0F0"/>
+              <a:srgbClr val="5FA1D8"/>
             </a:solidFill>
             <a:ln>
               <a:noFill/>
@@ -3900,7 +4253,7 @@
               </a:avLst>
             </a:prstGeom>
             <a:solidFill>
-              <a:schemeClr val="accent2"/>
+              <a:srgbClr val="F18B45"/>
             </a:solidFill>
             <a:ln>
               <a:noFill/>
@@ -3990,7 +4343,7 @@
               <a:avLst/>
             </a:prstGeom>
             <a:solidFill>
-              <a:srgbClr val="92D050"/>
+              <a:srgbClr val="498F34"/>
             </a:solidFill>
             <a:ln>
               <a:noFill/>
@@ -4145,7 +4498,7 @@
               </a:avLst>
             </a:prstGeom>
             <a:solidFill>
-              <a:srgbClr val="00B0F0"/>
+              <a:srgbClr val="5FA1D8"/>
             </a:solidFill>
             <a:ln>
               <a:noFill/>
@@ -4202,7 +4555,7 @@
               </a:avLst>
             </a:prstGeom>
             <a:solidFill>
-              <a:schemeClr val="accent2"/>
+              <a:srgbClr val="F18B45"/>
             </a:solidFill>
             <a:ln>
               <a:noFill/>
@@ -4292,7 +4645,7 @@
               <a:avLst/>
             </a:prstGeom>
             <a:solidFill>
-              <a:srgbClr val="92D050"/>
+              <a:srgbClr val="498F34"/>
             </a:solidFill>
             <a:ln>
               <a:noFill/>
@@ -4353,7 +4706,7 @@
               </a:avLst>
             </a:prstGeom>
             <a:solidFill>
-              <a:srgbClr val="00B0F0"/>
+              <a:srgbClr val="5FA1D8"/>
             </a:solidFill>
             <a:ln>
               <a:noFill/>
@@ -4410,7 +4763,7 @@
               </a:avLst>
             </a:prstGeom>
             <a:solidFill>
-              <a:schemeClr val="accent2"/>
+              <a:srgbClr val="F18B45"/>
             </a:solidFill>
             <a:ln>
               <a:noFill/>
@@ -4467,7 +4820,7 @@
               </a:avLst>
             </a:prstGeom>
             <a:solidFill>
-              <a:srgbClr val="00B0F0"/>
+              <a:srgbClr val="5FA1D8"/>
             </a:solidFill>
             <a:ln>
               <a:noFill/>
@@ -4524,7 +4877,7 @@
               </a:avLst>
             </a:prstGeom>
             <a:solidFill>
-              <a:schemeClr val="accent2"/>
+              <a:srgbClr val="F18B45"/>
             </a:solidFill>
             <a:ln>
               <a:noFill/>
@@ -4572,17 +4925,16 @@
           </p:nvSpPr>
           <p:spPr>
             <a:xfrm>
-              <a:off x="4349143" y="4056897"/>
+              <a:off x="4358108" y="4056897"/>
               <a:ext cx="1800000" cy="1080000"/>
             </a:xfrm>
             <a:prstGeom prst="rect">
               <a:avLst/>
             </a:prstGeom>
             <a:solidFill>
-              <a:schemeClr val="accent6">
-                <a:lumMod val="40000"/>
-                <a:lumOff val="60000"/>
-              </a:schemeClr>
+              <a:srgbClr val="498F34">
+                <a:alpha val="50196"/>
+              </a:srgbClr>
             </a:solidFill>
             <a:ln>
               <a:noFill/>
@@ -5035,4 +5387,299 @@
     </a:ext>
   </a:extLst>
 </a:theme>
+</file>
+
+<file path=ppt/theme/theme2.xml><?xml version="1.0" encoding="utf-8"?>
+<a:theme xmlns:a="http://schemas.openxmlformats.org/drawingml/2006/main" name="Office Theme">
+  <a:themeElements>
+    <a:clrScheme name="Office">
+      <a:dk1>
+        <a:sysClr val="windowText" lastClr="000000"/>
+      </a:dk1>
+      <a:lt1>
+        <a:sysClr val="window" lastClr="FFFFFF"/>
+      </a:lt1>
+      <a:dk2>
+        <a:srgbClr val="44546A"/>
+      </a:dk2>
+      <a:lt2>
+        <a:srgbClr val="E7E6E6"/>
+      </a:lt2>
+      <a:accent1>
+        <a:srgbClr val="4472C4"/>
+      </a:accent1>
+      <a:accent2>
+        <a:srgbClr val="ED7D31"/>
+      </a:accent2>
+      <a:accent3>
+        <a:srgbClr val="A5A5A5"/>
+      </a:accent3>
+      <a:accent4>
+        <a:srgbClr val="FFC000"/>
+      </a:accent4>
+      <a:accent5>
+        <a:srgbClr val="5B9BD5"/>
+      </a:accent5>
+      <a:accent6>
+        <a:srgbClr val="70AD47"/>
+      </a:accent6>
+      <a:hlink>
+        <a:srgbClr val="0563C1"/>
+      </a:hlink>
+      <a:folHlink>
+        <a:srgbClr val="954F72"/>
+      </a:folHlink>
+    </a:clrScheme>
+    <a:fontScheme name="Office">
+      <a:majorFont>
+        <a:latin typeface="Calibri Light" panose="020F0302020204030204"/>
+        <a:ea typeface=""/>
+        <a:cs typeface=""/>
+        <a:font script="Jpan" typeface="游ゴシック Light"/>
+        <a:font script="Hang" typeface="맑은 고딕"/>
+        <a:font script="Hans" typeface="等线 Light"/>
+        <a:font script="Hant" typeface="新細明體"/>
+        <a:font script="Arab" typeface="Times New Roman"/>
+        <a:font script="Hebr" typeface="Times New Roman"/>
+        <a:font script="Thai" typeface="Angsana New"/>
+        <a:font script="Ethi" typeface="Nyala"/>
+        <a:font script="Beng" typeface="Vrinda"/>
+        <a:font script="Gujr" typeface="Shruti"/>
+        <a:font script="Khmr" typeface="MoolBoran"/>
+        <a:font script="Knda" typeface="Tunga"/>
+        <a:font script="Guru" typeface="Raavi"/>
+        <a:font script="Cans" typeface="Euphemia"/>
+        <a:font script="Cher" typeface="Plantagenet Cherokee"/>
+        <a:font script="Yiii" typeface="Microsoft Yi Baiti"/>
+        <a:font script="Tibt" typeface="Microsoft Himalaya"/>
+        <a:font script="Thaa" typeface="MV Boli"/>
+        <a:font script="Deva" typeface="Mangal"/>
+        <a:font script="Telu" typeface="Gautami"/>
+        <a:font script="Taml" typeface="Latha"/>
+        <a:font script="Syrc" typeface="Estrangelo Edessa"/>
+        <a:font script="Orya" typeface="Kalinga"/>
+        <a:font script="Mlym" typeface="Kartika"/>
+        <a:font script="Laoo" typeface="DokChampa"/>
+        <a:font script="Sinh" typeface="Iskoola Pota"/>
+        <a:font script="Mong" typeface="Mongolian Baiti"/>
+        <a:font script="Viet" typeface="Times New Roman"/>
+        <a:font script="Uigh" typeface="Microsoft Uighur"/>
+        <a:font script="Geor" typeface="Sylfaen"/>
+        <a:font script="Armn" typeface="Arial"/>
+        <a:font script="Bugi" typeface="Leelawadee UI"/>
+        <a:font script="Bopo" typeface="Microsoft JhengHei"/>
+        <a:font script="Java" typeface="Javanese Text"/>
+        <a:font script="Lisu" typeface="Segoe UI"/>
+        <a:font script="Mymr" typeface="Myanmar Text"/>
+        <a:font script="Nkoo" typeface="Ebrima"/>
+        <a:font script="Olck" typeface="Nirmala UI"/>
+        <a:font script="Osma" typeface="Ebrima"/>
+        <a:font script="Phag" typeface="Phagspa"/>
+        <a:font script="Syrn" typeface="Estrangelo Edessa"/>
+        <a:font script="Syrj" typeface="Estrangelo Edessa"/>
+        <a:font script="Syre" typeface="Estrangelo Edessa"/>
+        <a:font script="Sora" typeface="Nirmala UI"/>
+        <a:font script="Tale" typeface="Microsoft Tai Le"/>
+        <a:font script="Talu" typeface="Microsoft New Tai Lue"/>
+        <a:font script="Tfng" typeface="Ebrima"/>
+      </a:majorFont>
+      <a:minorFont>
+        <a:latin typeface="Calibri" panose="020F0502020204030204"/>
+        <a:ea typeface=""/>
+        <a:cs typeface=""/>
+        <a:font script="Jpan" typeface="游ゴシック"/>
+        <a:font script="Hang" typeface="맑은 고딕"/>
+        <a:font script="Hans" typeface="等线"/>
+        <a:font script="Hant" typeface="新細明體"/>
+        <a:font script="Arab" typeface="Arial"/>
+        <a:font script="Hebr" typeface="Arial"/>
+        <a:font script="Thai" typeface="Cordia New"/>
+        <a:font script="Ethi" typeface="Nyala"/>
+        <a:font script="Beng" typeface="Vrinda"/>
+        <a:font script="Gujr" typeface="Shruti"/>
+        <a:font script="Khmr" typeface="DaunPenh"/>
+        <a:font script="Knda" typeface="Tunga"/>
+        <a:font script="Guru" typeface="Raavi"/>
+        <a:font script="Cans" typeface="Euphemia"/>
+        <a:font script="Cher" typeface="Plantagenet Cherokee"/>
+        <a:font script="Yiii" typeface="Microsoft Yi Baiti"/>
+        <a:font script="Tibt" typeface="Microsoft Himalaya"/>
+        <a:font script="Thaa" typeface="MV Boli"/>
+        <a:font script="Deva" typeface="Mangal"/>
+        <a:font script="Telu" typeface="Gautami"/>
+        <a:font script="Taml" typeface="Latha"/>
+        <a:font script="Syrc" typeface="Estrangelo Edessa"/>
+        <a:font script="Orya" typeface="Kalinga"/>
+        <a:font script="Mlym" typeface="Kartika"/>
+        <a:font script="Laoo" typeface="DokChampa"/>
+        <a:font script="Sinh" typeface="Iskoola Pota"/>
+        <a:font script="Mong" typeface="Mongolian Baiti"/>
+        <a:font script="Viet" typeface="Arial"/>
+        <a:font script="Uigh" typeface="Microsoft Uighur"/>
+        <a:font script="Geor" typeface="Sylfaen"/>
+        <a:font script="Armn" typeface="Arial"/>
+        <a:font script="Bugi" typeface="Leelawadee UI"/>
+        <a:font script="Bopo" typeface="Microsoft JhengHei"/>
+        <a:font script="Java" typeface="Javanese Text"/>
+        <a:font script="Lisu" typeface="Segoe UI"/>
+        <a:font script="Mymr" typeface="Myanmar Text"/>
+        <a:font script="Nkoo" typeface="Ebrima"/>
+        <a:font script="Olck" typeface="Nirmala UI"/>
+        <a:font script="Osma" typeface="Ebrima"/>
+        <a:font script="Phag" typeface="Phagspa"/>
+        <a:font script="Syrn" typeface="Estrangelo Edessa"/>
+        <a:font script="Syrj" typeface="Estrangelo Edessa"/>
+        <a:font script="Syre" typeface="Estrangelo Edessa"/>
+        <a:font script="Sora" typeface="Nirmala UI"/>
+        <a:font script="Tale" typeface="Microsoft Tai Le"/>
+        <a:font script="Talu" typeface="Microsoft New Tai Lue"/>
+        <a:font script="Tfng" typeface="Ebrima"/>
+      </a:minorFont>
+    </a:fontScheme>
+    <a:fmtScheme name="Office">
+      <a:fillStyleLst>
+        <a:solidFill>
+          <a:schemeClr val="phClr"/>
+        </a:solidFill>
+        <a:gradFill rotWithShape="1">
+          <a:gsLst>
+            <a:gs pos="0">
+              <a:schemeClr val="phClr">
+                <a:lumMod val="110000"/>
+                <a:satMod val="105000"/>
+                <a:tint val="67000"/>
+              </a:schemeClr>
+            </a:gs>
+            <a:gs pos="50000">
+              <a:schemeClr val="phClr">
+                <a:lumMod val="105000"/>
+                <a:satMod val="103000"/>
+                <a:tint val="73000"/>
+              </a:schemeClr>
+            </a:gs>
+            <a:gs pos="100000">
+              <a:schemeClr val="phClr">
+                <a:lumMod val="105000"/>
+                <a:satMod val="109000"/>
+                <a:tint val="81000"/>
+              </a:schemeClr>
+            </a:gs>
+          </a:gsLst>
+          <a:lin ang="5400000" scaled="0"/>
+        </a:gradFill>
+        <a:gradFill rotWithShape="1">
+          <a:gsLst>
+            <a:gs pos="0">
+              <a:schemeClr val="phClr">
+                <a:satMod val="103000"/>
+                <a:lumMod val="102000"/>
+                <a:tint val="94000"/>
+              </a:schemeClr>
+            </a:gs>
+            <a:gs pos="50000">
+              <a:schemeClr val="phClr">
+                <a:satMod val="110000"/>
+                <a:lumMod val="100000"/>
+                <a:shade val="100000"/>
+              </a:schemeClr>
+            </a:gs>
+            <a:gs pos="100000">
+              <a:schemeClr val="phClr">
+                <a:lumMod val="99000"/>
+                <a:satMod val="120000"/>
+                <a:shade val="78000"/>
+              </a:schemeClr>
+            </a:gs>
+          </a:gsLst>
+          <a:lin ang="5400000" scaled="0"/>
+        </a:gradFill>
+      </a:fillStyleLst>
+      <a:lnStyleLst>
+        <a:ln w="6350" cap="flat" cmpd="sng" algn="ctr">
+          <a:solidFill>
+            <a:schemeClr val="phClr"/>
+          </a:solidFill>
+          <a:prstDash val="solid"/>
+          <a:miter lim="800000"/>
+        </a:ln>
+        <a:ln w="12700" cap="flat" cmpd="sng" algn="ctr">
+          <a:solidFill>
+            <a:schemeClr val="phClr"/>
+          </a:solidFill>
+          <a:prstDash val="solid"/>
+          <a:miter lim="800000"/>
+        </a:ln>
+        <a:ln w="19050" cap="flat" cmpd="sng" algn="ctr">
+          <a:solidFill>
+            <a:schemeClr val="phClr"/>
+          </a:solidFill>
+          <a:prstDash val="solid"/>
+          <a:miter lim="800000"/>
+        </a:ln>
+      </a:lnStyleLst>
+      <a:effectStyleLst>
+        <a:effectStyle>
+          <a:effectLst/>
+        </a:effectStyle>
+        <a:effectStyle>
+          <a:effectLst/>
+        </a:effectStyle>
+        <a:effectStyle>
+          <a:effectLst>
+            <a:outerShdw blurRad="57150" dist="19050" dir="5400000" algn="ctr" rotWithShape="0">
+              <a:srgbClr val="000000">
+                <a:alpha val="63000"/>
+              </a:srgbClr>
+            </a:outerShdw>
+          </a:effectLst>
+        </a:effectStyle>
+      </a:effectStyleLst>
+      <a:bgFillStyleLst>
+        <a:solidFill>
+          <a:schemeClr val="phClr"/>
+        </a:solidFill>
+        <a:solidFill>
+          <a:schemeClr val="phClr">
+            <a:tint val="95000"/>
+            <a:satMod val="170000"/>
+          </a:schemeClr>
+        </a:solidFill>
+        <a:gradFill rotWithShape="1">
+          <a:gsLst>
+            <a:gs pos="0">
+              <a:schemeClr val="phClr">
+                <a:tint val="93000"/>
+                <a:satMod val="150000"/>
+                <a:shade val="98000"/>
+                <a:lumMod val="102000"/>
+              </a:schemeClr>
+            </a:gs>
+            <a:gs pos="50000">
+              <a:schemeClr val="phClr">
+                <a:tint val="98000"/>
+                <a:satMod val="130000"/>
+                <a:shade val="90000"/>
+                <a:lumMod val="103000"/>
+              </a:schemeClr>
+            </a:gs>
+            <a:gs pos="100000">
+              <a:schemeClr val="phClr">
+                <a:shade val="63000"/>
+                <a:satMod val="120000"/>
+              </a:schemeClr>
+            </a:gs>
+          </a:gsLst>
+          <a:lin ang="5400000" scaled="0"/>
+        </a:gradFill>
+      </a:bgFillStyleLst>
+    </a:fmtScheme>
+  </a:themeElements>
+  <a:objectDefaults/>
+  <a:extraClrSchemeLst/>
+  <a:extLst>
+    <a:ext uri="{05A4C25C-085E-4340-85A3-A5531E510DB2}">
+      <thm15:themeFamily xmlns:thm15="http://schemas.microsoft.com/office/thememl/2012/main" name="Office Theme" id="{62F939B6-93AF-4DB8-9C6B-D6C7DFDC589F}" vid="{4A3C46E8-61CC-4603-A589-7422A47A8E4A}"/>
+    </a:ext>
+  </a:extLst>
+</a:theme>
 </file>
</xml_diff>